<commit_message>
Update date in poster
</commit_message>
<xml_diff>
--- a/slides/wss22.pptx
+++ b/slides/wss22.pptx
@@ -3564,16 +3564,7 @@
                 <a:effectLst/>
                 <a:latin typeface="-apple-system"/>
               </a:rPr>
-              <a:t>: Dec </a:t>
-            </a:r>
-            <a:r>
-              <a:rPr lang="en-IN" dirty="0">
-                <a:solidFill>
-                  <a:srgbClr val="111111"/>
-                </a:solidFill>
-                <a:latin typeface="-apple-system"/>
-              </a:rPr>
-              <a:t>4</a:t>
+              <a:t>: Dec 5</a:t>
             </a:r>
             <a:r>
               <a:rPr lang="en-IN" baseline="30000" dirty="0">

</xml_diff>